<commit_message>
translate back to Chinese
</commit_message>
<xml_diff>
--- a/structural_scan.pptx
+++ b/structural_scan.pptx
@@ -104,6 +104,11 @@
       </a:defRPr>
     </a:lvl9pPr>
   </p:defaultTextStyle>
+  <p:extLst>
+    <p:ext uri="{EFAFB233-063F-42B5-8137-9DF3F51BA10A}">
+      <p15:sldGuideLst xmlns:p15="http://schemas.microsoft.com/office/powerpoint/2012/main"/>
+    </p:ext>
+  </p:extLst>
 </p:presentation>
 </file>
 
@@ -254,7 +259,7 @@
           <a:p>
             <a:fld id="{9C6EAF7F-79B7-9248-A98C-B8B95B058FDB}" type="datetimeFigureOut">
               <a:rPr lang="en-US" smtClean="0"/>
-              <a:t>5/8/24</a:t>
+              <a:t>6/10/25</a:t>
             </a:fld>
             <a:endParaRPr lang="en-US"/>
           </a:p>
@@ -452,7 +457,7 @@
           <a:p>
             <a:fld id="{9C6EAF7F-79B7-9248-A98C-B8B95B058FDB}" type="datetimeFigureOut">
               <a:rPr lang="en-US" smtClean="0"/>
-              <a:t>5/8/24</a:t>
+              <a:t>6/10/25</a:t>
             </a:fld>
             <a:endParaRPr lang="en-US"/>
           </a:p>
@@ -660,7 +665,7 @@
           <a:p>
             <a:fld id="{9C6EAF7F-79B7-9248-A98C-B8B95B058FDB}" type="datetimeFigureOut">
               <a:rPr lang="en-US" smtClean="0"/>
-              <a:t>5/8/24</a:t>
+              <a:t>6/10/25</a:t>
             </a:fld>
             <a:endParaRPr lang="en-US"/>
           </a:p>
@@ -858,7 +863,7 @@
           <a:p>
             <a:fld id="{9C6EAF7F-79B7-9248-A98C-B8B95B058FDB}" type="datetimeFigureOut">
               <a:rPr lang="en-US" smtClean="0"/>
-              <a:t>5/8/24</a:t>
+              <a:t>6/10/25</a:t>
             </a:fld>
             <a:endParaRPr lang="en-US"/>
           </a:p>
@@ -1133,7 +1138,7 @@
           <a:p>
             <a:fld id="{9C6EAF7F-79B7-9248-A98C-B8B95B058FDB}" type="datetimeFigureOut">
               <a:rPr lang="en-US" smtClean="0"/>
-              <a:t>5/8/24</a:t>
+              <a:t>6/10/25</a:t>
             </a:fld>
             <a:endParaRPr lang="en-US"/>
           </a:p>
@@ -1398,7 +1403,7 @@
           <a:p>
             <a:fld id="{9C6EAF7F-79B7-9248-A98C-B8B95B058FDB}" type="datetimeFigureOut">
               <a:rPr lang="en-US" smtClean="0"/>
-              <a:t>5/8/24</a:t>
+              <a:t>6/10/25</a:t>
             </a:fld>
             <a:endParaRPr lang="en-US"/>
           </a:p>
@@ -1810,7 +1815,7 @@
           <a:p>
             <a:fld id="{9C6EAF7F-79B7-9248-A98C-B8B95B058FDB}" type="datetimeFigureOut">
               <a:rPr lang="en-US" smtClean="0"/>
-              <a:t>5/8/24</a:t>
+              <a:t>6/10/25</a:t>
             </a:fld>
             <a:endParaRPr lang="en-US"/>
           </a:p>
@@ -1951,7 +1956,7 @@
           <a:p>
             <a:fld id="{9C6EAF7F-79B7-9248-A98C-B8B95B058FDB}" type="datetimeFigureOut">
               <a:rPr lang="en-US" smtClean="0"/>
-              <a:t>5/8/24</a:t>
+              <a:t>6/10/25</a:t>
             </a:fld>
             <a:endParaRPr lang="en-US"/>
           </a:p>
@@ -2064,7 +2069,7 @@
           <a:p>
             <a:fld id="{9C6EAF7F-79B7-9248-A98C-B8B95B058FDB}" type="datetimeFigureOut">
               <a:rPr lang="en-US" smtClean="0"/>
-              <a:t>5/8/24</a:t>
+              <a:t>6/10/25</a:t>
             </a:fld>
             <a:endParaRPr lang="en-US"/>
           </a:p>
@@ -2375,7 +2380,7 @@
           <a:p>
             <a:fld id="{9C6EAF7F-79B7-9248-A98C-B8B95B058FDB}" type="datetimeFigureOut">
               <a:rPr lang="en-US" smtClean="0"/>
-              <a:t>5/8/24</a:t>
+              <a:t>6/10/25</a:t>
             </a:fld>
             <a:endParaRPr lang="en-US"/>
           </a:p>
@@ -2663,7 +2668,7 @@
           <a:p>
             <a:fld id="{9C6EAF7F-79B7-9248-A98C-B8B95B058FDB}" type="datetimeFigureOut">
               <a:rPr lang="en-US" smtClean="0"/>
-              <a:t>5/8/24</a:t>
+              <a:t>6/10/25</a:t>
             </a:fld>
             <a:endParaRPr lang="en-US"/>
           </a:p>
@@ -2904,7 +2909,7 @@
           <a:p>
             <a:fld id="{9C6EAF7F-79B7-9248-A98C-B8B95B058FDB}" type="datetimeFigureOut">
               <a:rPr lang="en-US" smtClean="0"/>
-              <a:t>5/8/24</a:t>
+              <a:t>6/10/25</a:t>
             </a:fld>
             <a:endParaRPr lang="en-US"/>
           </a:p>
@@ -3343,8 +3348,8 @@
         </p:nvSpPr>
         <p:spPr>
           <a:xfrm>
-            <a:off x="1392116" y="3075057"/>
-            <a:ext cx="9407768" cy="707886"/>
+            <a:off x="3233678" y="2828835"/>
+            <a:ext cx="5724644" cy="1200329"/>
           </a:xfrm>
           <a:prstGeom prst="rect">
             <a:avLst/>
@@ -3358,15 +3363,24 @@
           <a:lstStyle/>
           <a:p>
             <a:r>
-              <a:rPr lang="en-US" sz="4000" dirty="0">
+              <a:rPr lang="en-US" sz="7200" dirty="0" err="1">
                 <a:solidFill>
                   <a:schemeClr val="bg1"/>
                 </a:solidFill>
-                <a:latin typeface="Arial" panose="020B0604020202020204" pitchFamily="34" charset="0"/>
+                <a:latin typeface="SimHei" panose="02010609060101010101" pitchFamily="49" charset="-122"/>
+                <a:ea typeface="SimHei" panose="02010609060101010101" pitchFamily="49" charset="-122"/>
                 <a:cs typeface="Arial" panose="020B0604020202020204" pitchFamily="34" charset="0"/>
               </a:rPr>
-              <a:t>You may close your eyes and take a rest</a:t>
-            </a:r>
+              <a:t>请您闭眼休息</a:t>
+            </a:r>
+            <a:endParaRPr lang="en-US" sz="7200" dirty="0">
+              <a:solidFill>
+                <a:schemeClr val="bg1"/>
+              </a:solidFill>
+              <a:latin typeface="SimHei" panose="02010609060101010101" pitchFamily="49" charset="-122"/>
+              <a:ea typeface="SimHei" panose="02010609060101010101" pitchFamily="49" charset="-122"/>
+              <a:cs typeface="Arial" panose="020B0604020202020204" pitchFamily="34" charset="0"/>
+            </a:endParaRPr>
           </a:p>
         </p:txBody>
       </p:sp>

</xml_diff>